<commit_message>
Added axample of native addons
</commit_message>
<xml_diff>
--- a/slides/nodejs.pptx
+++ b/slides/nodejs.pptx
@@ -210,7 +210,7 @@
           <a:p>
             <a:fld id="{27CF4125-CE2E-744A-9E29-30A65AA05302}" type="datetimeFigureOut">
               <a:rPr lang="it-IT" smtClean="0"/>
-              <a:t>15/09/17</a:t>
+              <a:t>16/09/17</a:t>
             </a:fld>
             <a:endParaRPr lang="it-IT"/>
           </a:p>
@@ -609,7 +609,7 @@
           <a:p>
             <a:fld id="{DC14897F-6134-E642-8D39-876FC0BAABE9}" type="datetimeFigureOut">
               <a:rPr lang="it-IT" smtClean="0"/>
-              <a:t>15/09/17</a:t>
+              <a:t>16/09/17</a:t>
             </a:fld>
             <a:endParaRPr lang="it-IT"/>
           </a:p>
@@ -779,7 +779,7 @@
           <a:p>
             <a:fld id="{DC14897F-6134-E642-8D39-876FC0BAABE9}" type="datetimeFigureOut">
               <a:rPr lang="it-IT" smtClean="0"/>
-              <a:t>15/09/17</a:t>
+              <a:t>16/09/17</a:t>
             </a:fld>
             <a:endParaRPr lang="it-IT"/>
           </a:p>
@@ -959,7 +959,7 @@
           <a:p>
             <a:fld id="{DC14897F-6134-E642-8D39-876FC0BAABE9}" type="datetimeFigureOut">
               <a:rPr lang="it-IT" smtClean="0"/>
-              <a:t>15/09/17</a:t>
+              <a:t>16/09/17</a:t>
             </a:fld>
             <a:endParaRPr lang="it-IT"/>
           </a:p>
@@ -1129,7 +1129,7 @@
           <a:p>
             <a:fld id="{DC14897F-6134-E642-8D39-876FC0BAABE9}" type="datetimeFigureOut">
               <a:rPr lang="it-IT" smtClean="0"/>
-              <a:t>15/09/17</a:t>
+              <a:t>16/09/17</a:t>
             </a:fld>
             <a:endParaRPr lang="it-IT"/>
           </a:p>
@@ -1375,7 +1375,7 @@
           <a:p>
             <a:fld id="{DC14897F-6134-E642-8D39-876FC0BAABE9}" type="datetimeFigureOut">
               <a:rPr lang="it-IT" smtClean="0"/>
-              <a:t>15/09/17</a:t>
+              <a:t>16/09/17</a:t>
             </a:fld>
             <a:endParaRPr lang="it-IT"/>
           </a:p>
@@ -1607,7 +1607,7 @@
           <a:p>
             <a:fld id="{DC14897F-6134-E642-8D39-876FC0BAABE9}" type="datetimeFigureOut">
               <a:rPr lang="it-IT" smtClean="0"/>
-              <a:t>15/09/17</a:t>
+              <a:t>16/09/17</a:t>
             </a:fld>
             <a:endParaRPr lang="it-IT"/>
           </a:p>
@@ -1974,7 +1974,7 @@
           <a:p>
             <a:fld id="{DC14897F-6134-E642-8D39-876FC0BAABE9}" type="datetimeFigureOut">
               <a:rPr lang="it-IT" smtClean="0"/>
-              <a:t>15/09/17</a:t>
+              <a:t>16/09/17</a:t>
             </a:fld>
             <a:endParaRPr lang="it-IT"/>
           </a:p>
@@ -2092,7 +2092,7 @@
           <a:p>
             <a:fld id="{DC14897F-6134-E642-8D39-876FC0BAABE9}" type="datetimeFigureOut">
               <a:rPr lang="it-IT" smtClean="0"/>
-              <a:t>15/09/17</a:t>
+              <a:t>16/09/17</a:t>
             </a:fld>
             <a:endParaRPr lang="it-IT"/>
           </a:p>
@@ -2187,7 +2187,7 @@
           <a:p>
             <a:fld id="{DC14897F-6134-E642-8D39-876FC0BAABE9}" type="datetimeFigureOut">
               <a:rPr lang="it-IT" smtClean="0"/>
-              <a:t>15/09/17</a:t>
+              <a:t>16/09/17</a:t>
             </a:fld>
             <a:endParaRPr lang="it-IT"/>
           </a:p>
@@ -2464,7 +2464,7 @@
           <a:p>
             <a:fld id="{DC14897F-6134-E642-8D39-876FC0BAABE9}" type="datetimeFigureOut">
               <a:rPr lang="it-IT" smtClean="0"/>
-              <a:t>15/09/17</a:t>
+              <a:t>16/09/17</a:t>
             </a:fld>
             <a:endParaRPr lang="it-IT"/>
           </a:p>
@@ -2717,7 +2717,7 @@
           <a:p>
             <a:fld id="{DC14897F-6134-E642-8D39-876FC0BAABE9}" type="datetimeFigureOut">
               <a:rPr lang="it-IT" smtClean="0"/>
-              <a:t>15/09/17</a:t>
+              <a:t>16/09/17</a:t>
             </a:fld>
             <a:endParaRPr lang="it-IT"/>
           </a:p>
@@ -2930,7 +2930,7 @@
           <a:p>
             <a:fld id="{DC14897F-6134-E642-8D39-876FC0BAABE9}" type="datetimeFigureOut">
               <a:rPr lang="it-IT" smtClean="0"/>
-              <a:t>15/09/17</a:t>
+              <a:t>16/09/17</a:t>
             </a:fld>
             <a:endParaRPr lang="it-IT"/>
           </a:p>
@@ -3587,8 +3587,8 @@
         </p:blipFill>
         <p:spPr>
           <a:xfrm>
-            <a:off x="3300912" y="1371600"/>
-            <a:ext cx="5590177" cy="3960000"/>
+            <a:off x="2976336" y="1097279"/>
+            <a:ext cx="6239328" cy="4419849"/>
           </a:xfrm>
           <a:prstGeom prst="rect">
             <a:avLst/>
@@ -6251,6 +6251,28 @@
                 </a:solidFill>
                 <a:latin typeface="+mn-lt"/>
               </a:rPr>
+              <a:t> </a:t>
+            </a:r>
+            <a:r>
+              <a:rPr lang="it-IT" sz="3600" dirty="0" smtClean="0">
+                <a:solidFill>
+                  <a:schemeClr val="bg1">
+                    <a:lumMod val="50000"/>
+                  </a:schemeClr>
+                </a:solidFill>
+                <a:latin typeface="+mn-lt"/>
+              </a:rPr>
+              <a:t>di</a:t>
+            </a:r>
+            <a:r>
+              <a:rPr lang="it-IT" sz="3600" b="1" dirty="0" smtClean="0">
+                <a:solidFill>
+                  <a:schemeClr val="bg1">
+                    <a:lumMod val="50000"/>
+                  </a:schemeClr>
+                </a:solidFill>
+                <a:latin typeface="+mn-lt"/>
+              </a:rPr>
               <a:t> Node.js</a:t>
             </a:r>
             <a:endParaRPr lang="it-IT" sz="3600" b="1" dirty="0">
@@ -6470,13 +6492,6 @@
               </a:rPr>
               <a:t>MICROSERVICES</a:t>
             </a:r>
-            <a:endParaRPr lang="it-IT" b="1" dirty="0" smtClean="0">
-              <a:solidFill>
-                <a:schemeClr val="bg1">
-                  <a:lumMod val="50000"/>
-                </a:schemeClr>
-              </a:solidFill>
-            </a:endParaRPr>
           </a:p>
           <a:p>
             <a:pPr marL="0" indent="0">
@@ -6675,13 +6690,13 @@
         </p:nvSpPr>
         <p:spPr>
           <a:xfrm>
-            <a:off x="838201" y="1780453"/>
-            <a:ext cx="3215640" cy="3015067"/>
+            <a:off x="838200" y="1780453"/>
+            <a:ext cx="7503160" cy="3482427"/>
           </a:xfrm>
         </p:spPr>
         <p:txBody>
           <a:bodyPr>
-            <a:normAutofit fontScale="92500" lnSpcReduction="20000"/>
+            <a:normAutofit fontScale="85000" lnSpcReduction="20000"/>
           </a:bodyPr>
           <a:lstStyle/>
           <a:p>
@@ -6741,8 +6756,54 @@
                   </a:schemeClr>
                 </a:solidFill>
               </a:rPr>
-              <a:t>SEMPLICITY FIRST</a:t>
-            </a:r>
+              <a:t>SINGLE THREADED</a:t>
+            </a:r>
+          </a:p>
+          <a:p>
+            <a:pPr marL="0" lvl="0" indent="0">
+              <a:lnSpc>
+                <a:spcPct val="100000"/>
+              </a:lnSpc>
+              <a:spcBef>
+                <a:spcPts val="0"/>
+              </a:spcBef>
+              <a:buNone/>
+            </a:pPr>
+            <a:endParaRPr lang="it-IT" b="1" dirty="0" smtClean="0">
+              <a:solidFill>
+                <a:schemeClr val="bg1">
+                  <a:lumMod val="50000"/>
+                </a:schemeClr>
+              </a:solidFill>
+            </a:endParaRPr>
+          </a:p>
+          <a:p>
+            <a:pPr marL="0" lvl="0" indent="0">
+              <a:lnSpc>
+                <a:spcPct val="100000"/>
+              </a:lnSpc>
+              <a:spcBef>
+                <a:spcPts val="0"/>
+              </a:spcBef>
+              <a:buNone/>
+            </a:pPr>
+            <a:r>
+              <a:rPr lang="it-IT" b="1" dirty="0" smtClean="0">
+                <a:solidFill>
+                  <a:schemeClr val="bg1">
+                    <a:lumMod val="50000"/>
+                  </a:schemeClr>
+                </a:solidFill>
+              </a:rPr>
+              <a:t>SEMPLICITY FIRST (Unix way)</a:t>
+            </a:r>
+            <a:endParaRPr lang="it-IT" b="1" dirty="0" smtClean="0">
+              <a:solidFill>
+                <a:schemeClr val="bg1">
+                  <a:lumMod val="50000"/>
+                </a:schemeClr>
+              </a:solidFill>
+            </a:endParaRPr>
           </a:p>
           <a:p>
             <a:pPr marL="0" lvl="0" indent="0">
@@ -6793,15 +6854,42 @@
               <a:t>T</a:t>
             </a:r>
             <a:r>
-              <a:rPr lang="is-IS" b="1" dirty="0">
-                <a:solidFill>
-                  <a:schemeClr val="bg1">
-                    <a:lumMod val="50000"/>
-                  </a:schemeClr>
-                </a:solidFill>
-              </a:rPr>
-              <a:t>Á</a:t>
-            </a:r>
+              <a:rPr lang="is-IS" b="1" dirty="0" smtClean="0">
+                <a:solidFill>
+                  <a:schemeClr val="bg1">
+                    <a:lumMod val="50000"/>
+                  </a:schemeClr>
+                </a:solidFill>
+              </a:rPr>
+              <a:t>Á (CommonJS </a:t>
+            </a:r>
+            <a:r>
+              <a:rPr lang="it-IT" b="1" dirty="0">
+                <a:solidFill>
+                  <a:schemeClr val="bg1">
+                    <a:lumMod val="50000"/>
+                  </a:schemeClr>
+                </a:solidFill>
+              </a:rPr>
+              <a:t>-</a:t>
+            </a:r>
+            <a:r>
+              <a:rPr lang="is-IS" b="1" dirty="0" smtClean="0">
+                <a:solidFill>
+                  <a:schemeClr val="bg1">
+                    <a:lumMod val="50000"/>
+                  </a:schemeClr>
+                </a:solidFill>
+              </a:rPr>
+              <a:t> ES6 v8.5.0 )</a:t>
+            </a:r>
+            <a:endParaRPr lang="is-IS" b="1" dirty="0">
+              <a:solidFill>
+                <a:schemeClr val="bg1">
+                  <a:lumMod val="50000"/>
+                </a:schemeClr>
+              </a:solidFill>
+            </a:endParaRPr>
           </a:p>
           <a:p>
             <a:pPr marL="0" indent="0">
@@ -6839,7 +6927,7 @@
                   </a:schemeClr>
                 </a:solidFill>
               </a:rPr>
-              <a:t>NPM</a:t>
+              <a:t>NPM </a:t>
             </a:r>
             <a:endParaRPr lang="is-IS" b="1" dirty="0" smtClean="0">
               <a:solidFill>
@@ -7083,7 +7171,7 @@
         </p:blipFill>
         <p:spPr>
           <a:xfrm>
-            <a:off x="1816101" y="3632200"/>
+            <a:off x="1785621" y="4048760"/>
             <a:ext cx="487680" cy="487680"/>
           </a:xfrm>
           <a:prstGeom prst="rect">

</xml_diff>